<commit_message>
merging nifti segmentation volumes
</commit_message>
<xml_diff>
--- a/Lab 1/Figures.pptx
+++ b/Lab 1/Figures.pptx
@@ -6,6 +6,7 @@
   </p:sldMasterIdLst>
   <p:sldIdLst>
     <p:sldId id="256" r:id="rId2"/>
+    <p:sldId id="257" r:id="rId3"/>
   </p:sldIdLst>
   <p:sldSz cx="12192000" cy="6858000"/>
   <p:notesSz cx="6858000" cy="9144000"/>
@@ -104,6 +105,11 @@
       </a:defRPr>
     </a:lvl9pPr>
   </p:defaultTextStyle>
+  <p:extLst>
+    <p:ext uri="{EFAFB233-063F-42B5-8137-9DF3F51BA10A}">
+      <p15:sldGuideLst xmlns:p15="http://schemas.microsoft.com/office/powerpoint/2012/main"/>
+    </p:ext>
+  </p:extLst>
 </p:presentation>
 </file>
 
@@ -254,7 +260,7 @@
           <a:p>
             <a:fld id="{B86F9F44-8BF4-47B9-AC91-BE574FFF27CC}" type="datetimeFigureOut">
               <a:rPr lang="en-US" smtClean="0"/>
-              <a:t>10/1/2023</a:t>
+              <a:t>10/3/2023</a:t>
             </a:fld>
             <a:endParaRPr lang="en-US"/>
           </a:p>
@@ -452,7 +458,7 @@
           <a:p>
             <a:fld id="{B86F9F44-8BF4-47B9-AC91-BE574FFF27CC}" type="datetimeFigureOut">
               <a:rPr lang="en-US" smtClean="0"/>
-              <a:t>10/1/2023</a:t>
+              <a:t>10/3/2023</a:t>
             </a:fld>
             <a:endParaRPr lang="en-US"/>
           </a:p>
@@ -660,7 +666,7 @@
           <a:p>
             <a:fld id="{B86F9F44-8BF4-47B9-AC91-BE574FFF27CC}" type="datetimeFigureOut">
               <a:rPr lang="en-US" smtClean="0"/>
-              <a:t>10/1/2023</a:t>
+              <a:t>10/3/2023</a:t>
             </a:fld>
             <a:endParaRPr lang="en-US"/>
           </a:p>
@@ -858,7 +864,7 @@
           <a:p>
             <a:fld id="{B86F9F44-8BF4-47B9-AC91-BE574FFF27CC}" type="datetimeFigureOut">
               <a:rPr lang="en-US" smtClean="0"/>
-              <a:t>10/1/2023</a:t>
+              <a:t>10/3/2023</a:t>
             </a:fld>
             <a:endParaRPr lang="en-US"/>
           </a:p>
@@ -1133,7 +1139,7 @@
           <a:p>
             <a:fld id="{B86F9F44-8BF4-47B9-AC91-BE574FFF27CC}" type="datetimeFigureOut">
               <a:rPr lang="en-US" smtClean="0"/>
-              <a:t>10/1/2023</a:t>
+              <a:t>10/3/2023</a:t>
             </a:fld>
             <a:endParaRPr lang="en-US"/>
           </a:p>
@@ -1398,7 +1404,7 @@
           <a:p>
             <a:fld id="{B86F9F44-8BF4-47B9-AC91-BE574FFF27CC}" type="datetimeFigureOut">
               <a:rPr lang="en-US" smtClean="0"/>
-              <a:t>10/1/2023</a:t>
+              <a:t>10/3/2023</a:t>
             </a:fld>
             <a:endParaRPr lang="en-US"/>
           </a:p>
@@ -1810,7 +1816,7 @@
           <a:p>
             <a:fld id="{B86F9F44-8BF4-47B9-AC91-BE574FFF27CC}" type="datetimeFigureOut">
               <a:rPr lang="en-US" smtClean="0"/>
-              <a:t>10/1/2023</a:t>
+              <a:t>10/3/2023</a:t>
             </a:fld>
             <a:endParaRPr lang="en-US"/>
           </a:p>
@@ -1951,7 +1957,7 @@
           <a:p>
             <a:fld id="{B86F9F44-8BF4-47B9-AC91-BE574FFF27CC}" type="datetimeFigureOut">
               <a:rPr lang="en-US" smtClean="0"/>
-              <a:t>10/1/2023</a:t>
+              <a:t>10/3/2023</a:t>
             </a:fld>
             <a:endParaRPr lang="en-US"/>
           </a:p>
@@ -2064,7 +2070,7 @@
           <a:p>
             <a:fld id="{B86F9F44-8BF4-47B9-AC91-BE574FFF27CC}" type="datetimeFigureOut">
               <a:rPr lang="en-US" smtClean="0"/>
-              <a:t>10/1/2023</a:t>
+              <a:t>10/3/2023</a:t>
             </a:fld>
             <a:endParaRPr lang="en-US"/>
           </a:p>
@@ -2375,7 +2381,7 @@
           <a:p>
             <a:fld id="{B86F9F44-8BF4-47B9-AC91-BE574FFF27CC}" type="datetimeFigureOut">
               <a:rPr lang="en-US" smtClean="0"/>
-              <a:t>10/1/2023</a:t>
+              <a:t>10/3/2023</a:t>
             </a:fld>
             <a:endParaRPr lang="en-US"/>
           </a:p>
@@ -2663,7 +2669,7 @@
           <a:p>
             <a:fld id="{B86F9F44-8BF4-47B9-AC91-BE574FFF27CC}" type="datetimeFigureOut">
               <a:rPr lang="en-US" smtClean="0"/>
-              <a:t>10/1/2023</a:t>
+              <a:t>10/3/2023</a:t>
             </a:fld>
             <a:endParaRPr lang="en-US"/>
           </a:p>
@@ -2904,7 +2910,7 @@
           <a:p>
             <a:fld id="{B86F9F44-8BF4-47B9-AC91-BE574FFF27CC}" type="datetimeFigureOut">
               <a:rPr lang="en-US" smtClean="0"/>
-              <a:t>10/1/2023</a:t>
+              <a:t>10/3/2023</a:t>
             </a:fld>
             <a:endParaRPr lang="en-US"/>
           </a:p>
@@ -4171,6 +4177,669 @@
 </p:sld>
 </file>
 
+<file path=ppt/slides/slide2.xml><?xml version="1.0" encoding="utf-8"?>
+<p:sld xmlns:a="http://schemas.openxmlformats.org/drawingml/2006/main" xmlns:r="http://schemas.openxmlformats.org/officeDocument/2006/relationships" xmlns:p="http://schemas.openxmlformats.org/presentationml/2006/main">
+  <p:cSld>
+    <p:spTree>
+      <p:nvGrpSpPr>
+        <p:cNvPr id="1" name=""/>
+        <p:cNvGrpSpPr/>
+        <p:nvPr/>
+      </p:nvGrpSpPr>
+      <p:grpSpPr>
+        <a:xfrm>
+          <a:off x="0" y="0"/>
+          <a:ext cx="0" cy="0"/>
+          <a:chOff x="0" y="0"/>
+          <a:chExt cx="0" cy="0"/>
+        </a:xfrm>
+      </p:grpSpPr>
+      <p:sp>
+        <p:nvSpPr>
+          <p:cNvPr id="10" name="TextBox 9">
+            <a:extLst>
+              <a:ext uri="{FF2B5EF4-FFF2-40B4-BE49-F238E27FC236}">
+                <a16:creationId xmlns:a16="http://schemas.microsoft.com/office/drawing/2014/main" id="{1BFC8D5B-E0EA-666D-943E-F83E5D09172A}"/>
+              </a:ext>
+            </a:extLst>
+          </p:cNvPr>
+          <p:cNvSpPr txBox="1"/>
+          <p:nvPr/>
+        </p:nvSpPr>
+        <p:spPr>
+          <a:xfrm>
+            <a:off x="915198" y="1644002"/>
+            <a:ext cx="1113692" cy="276999"/>
+          </a:xfrm>
+          <a:prstGeom prst="rect">
+            <a:avLst/>
+          </a:prstGeom>
+          <a:noFill/>
+        </p:spPr>
+        <p:txBody>
+          <a:bodyPr wrap="square" rtlCol="0">
+            <a:spAutoFit/>
+          </a:bodyPr>
+          <a:lstStyle/>
+          <a:p>
+            <a:pPr algn="ctr"/>
+            <a:r>
+              <a:rPr lang="en-US" sz="1200" dirty="0">
+                <a:latin typeface="Times New Roman" panose="02020603050405020304" pitchFamily="18" charset="0"/>
+                <a:cs typeface="Times New Roman" panose="02020603050405020304" pitchFamily="18" charset="0"/>
+              </a:rPr>
+              <a:t>T1</a:t>
+            </a:r>
+          </a:p>
+        </p:txBody>
+      </p:sp>
+      <p:sp>
+        <p:nvSpPr>
+          <p:cNvPr id="11" name="TextBox 10">
+            <a:extLst>
+              <a:ext uri="{FF2B5EF4-FFF2-40B4-BE49-F238E27FC236}">
+                <a16:creationId xmlns:a16="http://schemas.microsoft.com/office/drawing/2014/main" id="{6886EF9F-9D86-379B-F084-1EB53138383E}"/>
+              </a:ext>
+            </a:extLst>
+          </p:cNvPr>
+          <p:cNvSpPr txBox="1"/>
+          <p:nvPr/>
+        </p:nvSpPr>
+        <p:spPr>
+          <a:xfrm>
+            <a:off x="858802" y="3104562"/>
+            <a:ext cx="1226484" cy="646331"/>
+          </a:xfrm>
+          <a:prstGeom prst="rect">
+            <a:avLst/>
+          </a:prstGeom>
+          <a:noFill/>
+        </p:spPr>
+        <p:txBody>
+          <a:bodyPr wrap="square" rtlCol="0">
+            <a:spAutoFit/>
+          </a:bodyPr>
+          <a:lstStyle/>
+          <a:p>
+            <a:pPr algn="ctr"/>
+            <a:r>
+              <a:rPr lang="en-US" sz="1200" dirty="0">
+                <a:latin typeface="Times New Roman" panose="02020603050405020304" pitchFamily="18" charset="0"/>
+                <a:cs typeface="Times New Roman" panose="02020603050405020304" pitchFamily="18" charset="0"/>
+              </a:rPr>
+              <a:t>Merged Segmentation</a:t>
+            </a:r>
+          </a:p>
+          <a:p>
+            <a:pPr algn="ctr"/>
+            <a:r>
+              <a:rPr lang="en-US" sz="1200" dirty="0">
+                <a:latin typeface="Times New Roman" panose="02020603050405020304" pitchFamily="18" charset="0"/>
+                <a:cs typeface="Times New Roman" panose="02020603050405020304" pitchFamily="18" charset="0"/>
+              </a:rPr>
+              <a:t>GM+WM+CSF</a:t>
+            </a:r>
+          </a:p>
+        </p:txBody>
+      </p:sp>
+      <p:sp>
+        <p:nvSpPr>
+          <p:cNvPr id="13" name="TextBox 12">
+            <a:extLst>
+              <a:ext uri="{FF2B5EF4-FFF2-40B4-BE49-F238E27FC236}">
+                <a16:creationId xmlns:a16="http://schemas.microsoft.com/office/drawing/2014/main" id="{1599689E-1710-9C9C-F098-72609A174BAE}"/>
+              </a:ext>
+            </a:extLst>
+          </p:cNvPr>
+          <p:cNvSpPr txBox="1"/>
+          <p:nvPr/>
+        </p:nvSpPr>
+        <p:spPr>
+          <a:xfrm>
+            <a:off x="2398433" y="641146"/>
+            <a:ext cx="1113692" cy="276999"/>
+          </a:xfrm>
+          <a:prstGeom prst="rect">
+            <a:avLst/>
+          </a:prstGeom>
+          <a:noFill/>
+        </p:spPr>
+        <p:txBody>
+          <a:bodyPr wrap="square" rtlCol="0">
+            <a:spAutoFit/>
+          </a:bodyPr>
+          <a:lstStyle/>
+          <a:p>
+            <a:pPr algn="ctr"/>
+            <a:r>
+              <a:rPr lang="en-US" sz="1200" dirty="0">
+                <a:latin typeface="Times New Roman" panose="02020603050405020304" pitchFamily="18" charset="0"/>
+                <a:cs typeface="Times New Roman" panose="02020603050405020304" pitchFamily="18" charset="0"/>
+              </a:rPr>
+              <a:t>Subject 1</a:t>
+            </a:r>
+          </a:p>
+        </p:txBody>
+      </p:sp>
+      <p:sp>
+        <p:nvSpPr>
+          <p:cNvPr id="16" name="TextBox 15">
+            <a:extLst>
+              <a:ext uri="{FF2B5EF4-FFF2-40B4-BE49-F238E27FC236}">
+                <a16:creationId xmlns:a16="http://schemas.microsoft.com/office/drawing/2014/main" id="{52925003-F070-6344-1711-F1FCF8929B15}"/>
+              </a:ext>
+            </a:extLst>
+          </p:cNvPr>
+          <p:cNvSpPr txBox="1"/>
+          <p:nvPr/>
+        </p:nvSpPr>
+        <p:spPr>
+          <a:xfrm>
+            <a:off x="3786441" y="641146"/>
+            <a:ext cx="1113692" cy="276999"/>
+          </a:xfrm>
+          <a:prstGeom prst="rect">
+            <a:avLst/>
+          </a:prstGeom>
+          <a:noFill/>
+        </p:spPr>
+        <p:txBody>
+          <a:bodyPr wrap="square" rtlCol="0">
+            <a:spAutoFit/>
+          </a:bodyPr>
+          <a:lstStyle/>
+          <a:p>
+            <a:pPr algn="ctr"/>
+            <a:r>
+              <a:rPr lang="en-US" sz="1200" dirty="0">
+                <a:latin typeface="Times New Roman" panose="02020603050405020304" pitchFamily="18" charset="0"/>
+                <a:cs typeface="Times New Roman" panose="02020603050405020304" pitchFamily="18" charset="0"/>
+              </a:rPr>
+              <a:t>Subject 2</a:t>
+            </a:r>
+          </a:p>
+        </p:txBody>
+      </p:sp>
+      <p:sp>
+        <p:nvSpPr>
+          <p:cNvPr id="23" name="TextBox 22">
+            <a:extLst>
+              <a:ext uri="{FF2B5EF4-FFF2-40B4-BE49-F238E27FC236}">
+                <a16:creationId xmlns:a16="http://schemas.microsoft.com/office/drawing/2014/main" id="{E32B11AB-9367-CB62-0921-42A44485CA22}"/>
+              </a:ext>
+            </a:extLst>
+          </p:cNvPr>
+          <p:cNvSpPr txBox="1"/>
+          <p:nvPr/>
+        </p:nvSpPr>
+        <p:spPr>
+          <a:xfrm>
+            <a:off x="5174452" y="638092"/>
+            <a:ext cx="1113692" cy="276999"/>
+          </a:xfrm>
+          <a:prstGeom prst="rect">
+            <a:avLst/>
+          </a:prstGeom>
+          <a:noFill/>
+        </p:spPr>
+        <p:txBody>
+          <a:bodyPr wrap="square" rtlCol="0">
+            <a:spAutoFit/>
+          </a:bodyPr>
+          <a:lstStyle/>
+          <a:p>
+            <a:pPr algn="ctr"/>
+            <a:r>
+              <a:rPr lang="en-US" sz="1200" dirty="0">
+                <a:latin typeface="Times New Roman" panose="02020603050405020304" pitchFamily="18" charset="0"/>
+                <a:cs typeface="Times New Roman" panose="02020603050405020304" pitchFamily="18" charset="0"/>
+              </a:rPr>
+              <a:t>Subject 3</a:t>
+            </a:r>
+          </a:p>
+        </p:txBody>
+      </p:sp>
+      <p:sp>
+        <p:nvSpPr>
+          <p:cNvPr id="30" name="TextBox 29">
+            <a:extLst>
+              <a:ext uri="{FF2B5EF4-FFF2-40B4-BE49-F238E27FC236}">
+                <a16:creationId xmlns:a16="http://schemas.microsoft.com/office/drawing/2014/main" id="{AE234399-32B6-BDCD-2919-A1474AEFE7DD}"/>
+              </a:ext>
+            </a:extLst>
+          </p:cNvPr>
+          <p:cNvSpPr txBox="1"/>
+          <p:nvPr/>
+        </p:nvSpPr>
+        <p:spPr>
+          <a:xfrm>
+            <a:off x="6562460" y="638091"/>
+            <a:ext cx="1113692" cy="276999"/>
+          </a:xfrm>
+          <a:prstGeom prst="rect">
+            <a:avLst/>
+          </a:prstGeom>
+          <a:noFill/>
+        </p:spPr>
+        <p:txBody>
+          <a:bodyPr wrap="square" rtlCol="0">
+            <a:spAutoFit/>
+          </a:bodyPr>
+          <a:lstStyle/>
+          <a:p>
+            <a:pPr algn="ctr"/>
+            <a:r>
+              <a:rPr lang="en-US" sz="1200" dirty="0">
+                <a:latin typeface="Times New Roman" panose="02020603050405020304" pitchFamily="18" charset="0"/>
+                <a:cs typeface="Times New Roman" panose="02020603050405020304" pitchFamily="18" charset="0"/>
+              </a:rPr>
+              <a:t>Subject 4</a:t>
+            </a:r>
+          </a:p>
+        </p:txBody>
+      </p:sp>
+      <p:sp>
+        <p:nvSpPr>
+          <p:cNvPr id="37" name="TextBox 36">
+            <a:extLst>
+              <a:ext uri="{FF2B5EF4-FFF2-40B4-BE49-F238E27FC236}">
+                <a16:creationId xmlns:a16="http://schemas.microsoft.com/office/drawing/2014/main" id="{6442C1B5-95CA-EEAB-E5A3-775478D8D9C6}"/>
+              </a:ext>
+            </a:extLst>
+          </p:cNvPr>
+          <p:cNvSpPr txBox="1"/>
+          <p:nvPr/>
+        </p:nvSpPr>
+        <p:spPr>
+          <a:xfrm>
+            <a:off x="7950468" y="638090"/>
+            <a:ext cx="1113692" cy="276999"/>
+          </a:xfrm>
+          <a:prstGeom prst="rect">
+            <a:avLst/>
+          </a:prstGeom>
+          <a:noFill/>
+        </p:spPr>
+        <p:txBody>
+          <a:bodyPr wrap="square" rtlCol="0">
+            <a:spAutoFit/>
+          </a:bodyPr>
+          <a:lstStyle/>
+          <a:p>
+            <a:pPr algn="ctr"/>
+            <a:r>
+              <a:rPr lang="en-US" sz="1200" dirty="0">
+                <a:latin typeface="Times New Roman" panose="02020603050405020304" pitchFamily="18" charset="0"/>
+                <a:cs typeface="Times New Roman" panose="02020603050405020304" pitchFamily="18" charset="0"/>
+              </a:rPr>
+              <a:t>Subject 5</a:t>
+            </a:r>
+          </a:p>
+        </p:txBody>
+      </p:sp>
+      <p:pic>
+        <p:nvPicPr>
+          <p:cNvPr id="3" name="Picture 2" descr="A close up of a brain&#10;&#10;Description automatically generated">
+            <a:extLst>
+              <a:ext uri="{FF2B5EF4-FFF2-40B4-BE49-F238E27FC236}">
+                <a16:creationId xmlns:a16="http://schemas.microsoft.com/office/drawing/2014/main" id="{A24AE5EC-2AE5-485D-4B63-A17DB5D2082B}"/>
+              </a:ext>
+            </a:extLst>
+          </p:cNvPr>
+          <p:cNvPicPr>
+            <a:picLocks noChangeAspect="1"/>
+          </p:cNvPicPr>
+          <p:nvPr/>
+        </p:nvPicPr>
+        <p:blipFill rotWithShape="1">
+          <a:blip r:embed="rId2">
+            <a:extLst>
+              <a:ext uri="{28A0092B-C50C-407E-A947-70E740481C1C}">
+                <a14:useLocalDpi xmlns:a14="http://schemas.microsoft.com/office/drawing/2010/main" val="0"/>
+              </a:ext>
+            </a:extLst>
+          </a:blip>
+          <a:srcRect l="18275" t="6256" r="34012" b="8871"/>
+          <a:stretch/>
+        </p:blipFill>
+        <p:spPr>
+          <a:xfrm>
+            <a:off x="2342037" y="1063547"/>
+            <a:ext cx="1226484" cy="1437913"/>
+          </a:xfrm>
+          <a:prstGeom prst="rect">
+            <a:avLst/>
+          </a:prstGeom>
+        </p:spPr>
+      </p:pic>
+      <p:pic>
+        <p:nvPicPr>
+          <p:cNvPr id="6" name="Picture 5" descr="A screen shot of a brain&#10;&#10;Description automatically generated">
+            <a:extLst>
+              <a:ext uri="{FF2B5EF4-FFF2-40B4-BE49-F238E27FC236}">
+                <a16:creationId xmlns:a16="http://schemas.microsoft.com/office/drawing/2014/main" id="{25E6E7CF-7F73-D972-6518-5D524D1753AC}"/>
+              </a:ext>
+            </a:extLst>
+          </p:cNvPr>
+          <p:cNvPicPr>
+            <a:picLocks noChangeAspect="1"/>
+          </p:cNvPicPr>
+          <p:nvPr/>
+        </p:nvPicPr>
+        <p:blipFill rotWithShape="1">
+          <a:blip r:embed="rId3">
+            <a:extLst>
+              <a:ext uri="{28A0092B-C50C-407E-A947-70E740481C1C}">
+                <a14:useLocalDpi xmlns:a14="http://schemas.microsoft.com/office/drawing/2010/main" val="0"/>
+              </a:ext>
+            </a:extLst>
+          </a:blip>
+          <a:srcRect l="19956" t="5404" r="37537" b="11338"/>
+          <a:stretch/>
+        </p:blipFill>
+        <p:spPr>
+          <a:xfrm>
+            <a:off x="2342037" y="2646862"/>
+            <a:ext cx="1226484" cy="1583315"/>
+          </a:xfrm>
+          <a:prstGeom prst="rect">
+            <a:avLst/>
+          </a:prstGeom>
+        </p:spPr>
+      </p:pic>
+      <p:pic>
+        <p:nvPicPr>
+          <p:cNvPr id="14" name="Picture 13" descr="A screenshot of a computer screen&#10;&#10;Description automatically generated">
+            <a:extLst>
+              <a:ext uri="{FF2B5EF4-FFF2-40B4-BE49-F238E27FC236}">
+                <a16:creationId xmlns:a16="http://schemas.microsoft.com/office/drawing/2014/main" id="{06FB352E-8BC6-A79B-40E7-267D9069A278}"/>
+              </a:ext>
+            </a:extLst>
+          </p:cNvPr>
+          <p:cNvPicPr>
+            <a:picLocks noChangeAspect="1"/>
+          </p:cNvPicPr>
+          <p:nvPr/>
+        </p:nvPicPr>
+        <p:blipFill rotWithShape="1">
+          <a:blip r:embed="rId4">
+            <a:extLst>
+              <a:ext uri="{28A0092B-C50C-407E-A947-70E740481C1C}">
+                <a14:useLocalDpi xmlns:a14="http://schemas.microsoft.com/office/drawing/2010/main" val="0"/>
+              </a:ext>
+            </a:extLst>
+          </a:blip>
+          <a:srcRect l="13491" t="8505" r="29648" b="7358"/>
+          <a:stretch/>
+        </p:blipFill>
+        <p:spPr>
+          <a:xfrm>
+            <a:off x="3730044" y="2646861"/>
+            <a:ext cx="1226485" cy="1583315"/>
+          </a:xfrm>
+          <a:prstGeom prst="rect">
+            <a:avLst/>
+          </a:prstGeom>
+        </p:spPr>
+      </p:pic>
+      <p:pic>
+        <p:nvPicPr>
+          <p:cNvPr id="19" name="Picture 18" descr="A close up of a brain&#10;&#10;Description automatically generated">
+            <a:extLst>
+              <a:ext uri="{FF2B5EF4-FFF2-40B4-BE49-F238E27FC236}">
+                <a16:creationId xmlns:a16="http://schemas.microsoft.com/office/drawing/2014/main" id="{C898DB96-2797-67B5-5AAE-3543EADF42ED}"/>
+              </a:ext>
+            </a:extLst>
+          </p:cNvPr>
+          <p:cNvPicPr>
+            <a:picLocks noChangeAspect="1"/>
+          </p:cNvPicPr>
+          <p:nvPr/>
+        </p:nvPicPr>
+        <p:blipFill rotWithShape="1">
+          <a:blip r:embed="rId5">
+            <a:extLst>
+              <a:ext uri="{28A0092B-C50C-407E-A947-70E740481C1C}">
+                <a14:useLocalDpi xmlns:a14="http://schemas.microsoft.com/office/drawing/2010/main" val="0"/>
+              </a:ext>
+            </a:extLst>
+          </a:blip>
+          <a:srcRect l="9845" t="8593" r="24521" b="6436"/>
+          <a:stretch/>
+        </p:blipFill>
+        <p:spPr>
+          <a:xfrm>
+            <a:off x="3706732" y="1063546"/>
+            <a:ext cx="1273110" cy="1437913"/>
+          </a:xfrm>
+          <a:prstGeom prst="rect">
+            <a:avLst/>
+          </a:prstGeom>
+        </p:spPr>
+      </p:pic>
+      <p:pic>
+        <p:nvPicPr>
+          <p:cNvPr id="24" name="Picture 23" descr="A screenshot of a computer screen&#10;&#10;Description automatically generated">
+            <a:extLst>
+              <a:ext uri="{FF2B5EF4-FFF2-40B4-BE49-F238E27FC236}">
+                <a16:creationId xmlns:a16="http://schemas.microsoft.com/office/drawing/2014/main" id="{0C810380-DE08-1722-A11A-FA53FF04B2F8}"/>
+              </a:ext>
+            </a:extLst>
+          </p:cNvPr>
+          <p:cNvPicPr>
+            <a:picLocks noChangeAspect="1"/>
+          </p:cNvPicPr>
+          <p:nvPr/>
+        </p:nvPicPr>
+        <p:blipFill rotWithShape="1">
+          <a:blip r:embed="rId6">
+            <a:extLst>
+              <a:ext uri="{28A0092B-C50C-407E-A947-70E740481C1C}">
+                <a14:useLocalDpi xmlns:a14="http://schemas.microsoft.com/office/drawing/2010/main" val="0"/>
+              </a:ext>
+            </a:extLst>
+          </a:blip>
+          <a:srcRect l="14269" t="11128" r="33190" b="11128"/>
+          <a:stretch/>
+        </p:blipFill>
+        <p:spPr>
+          <a:xfrm>
+            <a:off x="5118054" y="2646862"/>
+            <a:ext cx="1226485" cy="1583314"/>
+          </a:xfrm>
+          <a:prstGeom prst="rect">
+            <a:avLst/>
+          </a:prstGeom>
+        </p:spPr>
+      </p:pic>
+      <p:pic>
+        <p:nvPicPr>
+          <p:cNvPr id="28" name="Picture 27" descr="A close-up of a brain scan&#10;&#10;Description automatically generated">
+            <a:extLst>
+              <a:ext uri="{FF2B5EF4-FFF2-40B4-BE49-F238E27FC236}">
+                <a16:creationId xmlns:a16="http://schemas.microsoft.com/office/drawing/2014/main" id="{288183BC-049D-2B4C-E2F0-04558423E14E}"/>
+              </a:ext>
+            </a:extLst>
+          </p:cNvPr>
+          <p:cNvPicPr>
+            <a:picLocks noChangeAspect="1"/>
+          </p:cNvPicPr>
+          <p:nvPr/>
+        </p:nvPicPr>
+        <p:blipFill rotWithShape="1">
+          <a:blip r:embed="rId7">
+            <a:extLst>
+              <a:ext uri="{28A0092B-C50C-407E-A947-70E740481C1C}">
+                <a14:useLocalDpi xmlns:a14="http://schemas.microsoft.com/office/drawing/2010/main" val="0"/>
+              </a:ext>
+            </a:extLst>
+          </a:blip>
+          <a:srcRect l="8463" t="9773" r="25672" b="4959"/>
+          <a:stretch/>
+        </p:blipFill>
+        <p:spPr>
+          <a:xfrm>
+            <a:off x="5118053" y="1063544"/>
+            <a:ext cx="1227659" cy="1386579"/>
+          </a:xfrm>
+          <a:prstGeom prst="rect">
+            <a:avLst/>
+          </a:prstGeom>
+        </p:spPr>
+      </p:pic>
+      <p:pic>
+        <p:nvPicPr>
+          <p:cNvPr id="33" name="Picture 32" descr="A screenshot of a computer screen&#10;&#10;Description automatically generated">
+            <a:extLst>
+              <a:ext uri="{FF2B5EF4-FFF2-40B4-BE49-F238E27FC236}">
+                <a16:creationId xmlns:a16="http://schemas.microsoft.com/office/drawing/2014/main" id="{4EA18754-A429-EB2C-E8C3-17195372165D}"/>
+              </a:ext>
+            </a:extLst>
+          </p:cNvPr>
+          <p:cNvPicPr>
+            <a:picLocks noChangeAspect="1"/>
+          </p:cNvPicPr>
+          <p:nvPr/>
+        </p:nvPicPr>
+        <p:blipFill rotWithShape="1">
+          <a:blip r:embed="rId8">
+            <a:extLst>
+              <a:ext uri="{28A0092B-C50C-407E-A947-70E740481C1C}">
+                <a14:useLocalDpi xmlns:a14="http://schemas.microsoft.com/office/drawing/2010/main" val="0"/>
+              </a:ext>
+            </a:extLst>
+          </a:blip>
+          <a:srcRect l="14311" t="11897" r="32156" b="8890"/>
+          <a:stretch/>
+        </p:blipFill>
+        <p:spPr>
+          <a:xfrm>
+            <a:off x="6506064" y="2646862"/>
+            <a:ext cx="1226484" cy="1583314"/>
+          </a:xfrm>
+          <a:prstGeom prst="rect">
+            <a:avLst/>
+          </a:prstGeom>
+        </p:spPr>
+      </p:pic>
+      <p:pic>
+        <p:nvPicPr>
+          <p:cNvPr id="38" name="Picture 37" descr="A close-up of a brain scan&#10;&#10;Description automatically generated">
+            <a:extLst>
+              <a:ext uri="{FF2B5EF4-FFF2-40B4-BE49-F238E27FC236}">
+                <a16:creationId xmlns:a16="http://schemas.microsoft.com/office/drawing/2014/main" id="{08C98F71-EE16-60A1-85E2-79B3BCF46EA6}"/>
+              </a:ext>
+            </a:extLst>
+          </p:cNvPr>
+          <p:cNvPicPr>
+            <a:picLocks noChangeAspect="1"/>
+          </p:cNvPicPr>
+          <p:nvPr/>
+        </p:nvPicPr>
+        <p:blipFill rotWithShape="1">
+          <a:blip r:embed="rId9">
+            <a:extLst>
+              <a:ext uri="{28A0092B-C50C-407E-A947-70E740481C1C}">
+                <a14:useLocalDpi xmlns:a14="http://schemas.microsoft.com/office/drawing/2010/main" val="0"/>
+              </a:ext>
+            </a:extLst>
+          </a:blip>
+          <a:srcRect l="8355" t="10231" r="29042" b="8520"/>
+          <a:stretch/>
+        </p:blipFill>
+        <p:spPr>
+          <a:xfrm>
+            <a:off x="6507963" y="1063544"/>
+            <a:ext cx="1224585" cy="1386579"/>
+          </a:xfrm>
+          <a:prstGeom prst="rect">
+            <a:avLst/>
+          </a:prstGeom>
+        </p:spPr>
+      </p:pic>
+      <p:pic>
+        <p:nvPicPr>
+          <p:cNvPr id="42" name="Picture 41" descr="A screenshot of a computer screen&#10;&#10;Description automatically generated">
+            <a:extLst>
+              <a:ext uri="{FF2B5EF4-FFF2-40B4-BE49-F238E27FC236}">
+                <a16:creationId xmlns:a16="http://schemas.microsoft.com/office/drawing/2014/main" id="{87B9B022-9D7C-CEB2-1850-8E9BF348C897}"/>
+              </a:ext>
+            </a:extLst>
+          </p:cNvPr>
+          <p:cNvPicPr>
+            <a:picLocks noChangeAspect="1"/>
+          </p:cNvPicPr>
+          <p:nvPr/>
+        </p:nvPicPr>
+        <p:blipFill rotWithShape="1">
+          <a:blip r:embed="rId10">
+            <a:extLst>
+              <a:ext uri="{28A0092B-C50C-407E-A947-70E740481C1C}">
+                <a14:useLocalDpi xmlns:a14="http://schemas.microsoft.com/office/drawing/2010/main" val="0"/>
+              </a:ext>
+            </a:extLst>
+          </a:blip>
+          <a:srcRect l="14275" t="13350" r="31969" b="8884"/>
+          <a:stretch/>
+        </p:blipFill>
+        <p:spPr>
+          <a:xfrm>
+            <a:off x="7894073" y="2637343"/>
+            <a:ext cx="1254507" cy="1583314"/>
+          </a:xfrm>
+          <a:prstGeom prst="rect">
+            <a:avLst/>
+          </a:prstGeom>
+        </p:spPr>
+      </p:pic>
+      <p:pic>
+        <p:nvPicPr>
+          <p:cNvPr id="44" name="Picture 43" descr="A close-up of a brain scan&#10;&#10;Description automatically generated">
+            <a:extLst>
+              <a:ext uri="{FF2B5EF4-FFF2-40B4-BE49-F238E27FC236}">
+                <a16:creationId xmlns:a16="http://schemas.microsoft.com/office/drawing/2014/main" id="{F40FA082-48EA-FC21-FF88-3BEF34CB1BD2}"/>
+              </a:ext>
+            </a:extLst>
+          </p:cNvPr>
+          <p:cNvPicPr>
+            <a:picLocks noChangeAspect="1"/>
+          </p:cNvPicPr>
+          <p:nvPr/>
+        </p:nvPicPr>
+        <p:blipFill rotWithShape="1">
+          <a:blip r:embed="rId11">
+            <a:extLst>
+              <a:ext uri="{28A0092B-C50C-407E-A947-70E740481C1C}">
+                <a14:useLocalDpi xmlns:a14="http://schemas.microsoft.com/office/drawing/2010/main" val="0"/>
+              </a:ext>
+            </a:extLst>
+          </a:blip>
+          <a:srcRect l="8796" t="9930" r="24518" b="3522"/>
+          <a:stretch/>
+        </p:blipFill>
+        <p:spPr>
+          <a:xfrm>
+            <a:off x="7875470" y="1056326"/>
+            <a:ext cx="1273110" cy="1441523"/>
+          </a:xfrm>
+          <a:prstGeom prst="rect">
+            <a:avLst/>
+          </a:prstGeom>
+        </p:spPr>
+      </p:pic>
+    </p:spTree>
+    <p:extLst>
+      <p:ext uri="{BB962C8B-B14F-4D97-AF65-F5344CB8AC3E}">
+        <p14:creationId xmlns:p14="http://schemas.microsoft.com/office/powerpoint/2010/main" val="4008124844"/>
+      </p:ext>
+    </p:extLst>
+  </p:cSld>
+  <p:clrMapOvr>
+    <a:masterClrMapping/>
+  </p:clrMapOvr>
+</p:sld>
+</file>
+
 <file path=ppt/theme/theme1.xml><?xml version="1.0" encoding="utf-8"?>
 <a:theme xmlns:a="http://schemas.openxmlformats.org/drawingml/2006/main" name="Office Theme">
   <a:themeElements>

</xml_diff>